<commit_message>
modifs diapo et cdc
</commit_message>
<xml_diff>
--- a/revue de projet.pptx
+++ b/revue de projet.pptx
@@ -13,10 +13,9 @@
     <p:sldId id="263" r:id="rId7"/>
     <p:sldId id="264" r:id="rId8"/>
     <p:sldId id="266" r:id="rId9"/>
-    <p:sldId id="267" r:id="rId10"/>
-    <p:sldId id="262" r:id="rId11"/>
-    <p:sldId id="257" r:id="rId12"/>
-    <p:sldId id="268" r:id="rId13"/>
+    <p:sldId id="262" r:id="rId10"/>
+    <p:sldId id="257" r:id="rId11"/>
+    <p:sldId id="268" r:id="rId12"/>
   </p:sldIdLst>
   <p:sldSz cx="12192000" cy="6858000"/>
   <p:notesSz cx="6858000" cy="9144000"/>
@@ -3551,136 +3550,6 @@
       </p:grpSpPr>
       <p:sp>
         <p:nvSpPr>
-          <p:cNvPr id="2" name="Titre 1">
-            <a:extLst>
-              <a:ext uri="{FF2B5EF4-FFF2-40B4-BE49-F238E27FC236}">
-                <a16:creationId xmlns:a16="http://schemas.microsoft.com/office/drawing/2014/main" id="{8957233C-3719-45B3-A20B-D3060EB1F688}"/>
-              </a:ext>
-            </a:extLst>
-          </p:cNvPr>
-          <p:cNvSpPr>
-            <a:spLocks noGrp="1"/>
-          </p:cNvSpPr>
-          <p:nvPr>
-            <p:ph type="title"/>
-          </p:nvPr>
-        </p:nvSpPr>
-        <p:spPr/>
-        <p:txBody>
-          <a:bodyPr/>
-          <a:lstStyle/>
-          <a:p>
-            <a:r>
-              <a:rPr lang="fr-FR" dirty="0"/>
-              <a:t>Tâches à effectuer</a:t>
-            </a:r>
-          </a:p>
-        </p:txBody>
-      </p:sp>
-      <p:sp>
-        <p:nvSpPr>
-          <p:cNvPr id="3" name="Espace réservé du contenu 2">
-            <a:extLst>
-              <a:ext uri="{FF2B5EF4-FFF2-40B4-BE49-F238E27FC236}">
-                <a16:creationId xmlns:a16="http://schemas.microsoft.com/office/drawing/2014/main" id="{3FA24D38-528D-44F9-95B6-9D15BD6E7304}"/>
-              </a:ext>
-            </a:extLst>
-          </p:cNvPr>
-          <p:cNvSpPr>
-            <a:spLocks noGrp="1"/>
-          </p:cNvSpPr>
-          <p:nvPr>
-            <p:ph idx="1"/>
-          </p:nvPr>
-        </p:nvSpPr>
-        <p:spPr>
-          <a:xfrm>
-            <a:off x="737532" y="1850792"/>
-            <a:ext cx="10515600" cy="4351338"/>
-          </a:xfrm>
-        </p:spPr>
-        <p:txBody>
-          <a:bodyPr/>
-          <a:lstStyle/>
-          <a:p>
-            <a:r>
-              <a:rPr lang="fr-FR" dirty="0"/>
-              <a:t>Diagramme de cas d’utilisation</a:t>
-            </a:r>
-          </a:p>
-        </p:txBody>
-      </p:sp>
-      <p:pic>
-        <p:nvPicPr>
-          <p:cNvPr id="5" name="Image 4">
-            <a:extLst>
-              <a:ext uri="{FF2B5EF4-FFF2-40B4-BE49-F238E27FC236}">
-                <a16:creationId xmlns:a16="http://schemas.microsoft.com/office/drawing/2014/main" id="{94E34C19-69F9-4A53-BF71-C8B77C19C305}"/>
-              </a:ext>
-            </a:extLst>
-          </p:cNvPr>
-          <p:cNvPicPr/>
-          <p:nvPr/>
-        </p:nvPicPr>
-        <p:blipFill>
-          <a:blip r:embed="rId2">
-            <a:extLst>
-              <a:ext uri="{28A0092B-C50C-407E-A947-70E740481C1C}">
-                <a14:useLocalDpi xmlns:a14="http://schemas.microsoft.com/office/drawing/2010/main" val="0"/>
-              </a:ext>
-            </a:extLst>
-          </a:blip>
-          <a:srcRect/>
-          <a:stretch>
-            <a:fillRect/>
-          </a:stretch>
-        </p:blipFill>
-        <p:spPr bwMode="auto">
-          <a:xfrm>
-            <a:off x="3447031" y="2484452"/>
-            <a:ext cx="4375150" cy="3600450"/>
-          </a:xfrm>
-          <a:prstGeom prst="rect">
-            <a:avLst/>
-          </a:prstGeom>
-          <a:noFill/>
-          <a:ln>
-            <a:noFill/>
-          </a:ln>
-        </p:spPr>
-      </p:pic>
-    </p:spTree>
-    <p:extLst>
-      <p:ext uri="{BB962C8B-B14F-4D97-AF65-F5344CB8AC3E}">
-        <p14:creationId xmlns:p14="http://schemas.microsoft.com/office/powerpoint/2010/main" val="1216803554"/>
-      </p:ext>
-    </p:extLst>
-  </p:cSld>
-  <p:clrMapOvr>
-    <a:masterClrMapping/>
-  </p:clrMapOvr>
-</p:sld>
-</file>
-
-<file path=ppt/slides/slide11.xml><?xml version="1.0" encoding="utf-8"?>
-<p:sld xmlns:a="http://schemas.openxmlformats.org/drawingml/2006/main" xmlns:r="http://schemas.openxmlformats.org/officeDocument/2006/relationships" xmlns:p="http://schemas.openxmlformats.org/presentationml/2006/main">
-  <p:cSld>
-    <p:spTree>
-      <p:nvGrpSpPr>
-        <p:cNvPr id="1" name=""/>
-        <p:cNvGrpSpPr/>
-        <p:nvPr/>
-      </p:nvGrpSpPr>
-      <p:grpSpPr>
-        <a:xfrm>
-          <a:off x="0" y="0"/>
-          <a:ext cx="0" cy="0"/>
-          <a:chOff x="0" y="0"/>
-          <a:chExt cx="0" cy="0"/>
-        </a:xfrm>
-      </p:grpSpPr>
-      <p:sp>
-        <p:nvSpPr>
           <p:cNvPr id="3" name="Espace réservé du contenu 2">
             <a:extLst>
               <a:ext uri="{FF2B5EF4-FFF2-40B4-BE49-F238E27FC236}">
@@ -3967,7 +3836,7 @@
 </p:sld>
 </file>
 
-<file path=ppt/slides/slide12.xml><?xml version="1.0" encoding="utf-8"?>
+<file path=ppt/slides/slide11.xml><?xml version="1.0" encoding="utf-8"?>
 <p:sld xmlns:a="http://schemas.openxmlformats.org/drawingml/2006/main" xmlns:r="http://schemas.openxmlformats.org/officeDocument/2006/relationships" xmlns:p="http://schemas.openxmlformats.org/presentationml/2006/main">
   <p:cSld>
     <p:spTree>
@@ -4000,7 +3869,12 @@
             <p:ph type="title"/>
           </p:nvPr>
         </p:nvSpPr>
-        <p:spPr/>
+        <p:spPr>
+          <a:xfrm>
+            <a:off x="838200" y="329614"/>
+            <a:ext cx="10515600" cy="1325563"/>
+          </a:xfrm>
+        </p:spPr>
         <p:txBody>
           <a:bodyPr/>
           <a:lstStyle/>
@@ -4042,7 +3916,7 @@
         </p:blipFill>
         <p:spPr>
           <a:xfrm>
-            <a:off x="3602932" y="1235758"/>
+            <a:off x="3665078" y="1218003"/>
             <a:ext cx="7961698" cy="5622242"/>
           </a:xfrm>
         </p:spPr>
@@ -4075,7 +3949,7 @@
         </p:blipFill>
         <p:spPr>
           <a:xfrm>
-            <a:off x="235085" y="1235758"/>
+            <a:off x="235085" y="1200242"/>
             <a:ext cx="3367847" cy="5622242"/>
           </a:xfrm>
           <a:prstGeom prst="rect">
@@ -4295,39 +4169,47 @@
           <a:p>
             <a:r>
               <a:rPr lang="fr-FR" dirty="0"/>
-              <a:t>Tâches à effectuer</a:t>
-            </a:r>
-          </a:p>
-        </p:txBody>
-      </p:sp>
-      <p:sp>
-        <p:nvSpPr>
-          <p:cNvPr id="3" name="Espace réservé du contenu 2">
-            <a:extLst>
-              <a:ext uri="{FF2B5EF4-FFF2-40B4-BE49-F238E27FC236}">
-                <a16:creationId xmlns:a16="http://schemas.microsoft.com/office/drawing/2014/main" id="{E663FA35-A08B-44BD-A761-4D373AE96ADB}"/>
-              </a:ext>
-            </a:extLst>
-          </p:cNvPr>
-          <p:cNvSpPr>
-            <a:spLocks noGrp="1"/>
-          </p:cNvSpPr>
-          <p:nvPr>
-            <p:ph idx="1"/>
-          </p:nvPr>
-        </p:nvSpPr>
-        <p:spPr/>
-        <p:txBody>
-          <a:bodyPr/>
-          <a:lstStyle/>
-          <a:p>
-            <a:r>
-              <a:rPr lang="fr-FR" dirty="0"/>
-              <a:t>Base de données du stock</a:t>
-            </a:r>
-          </a:p>
-        </p:txBody>
-      </p:sp>
+              <a:t>Tâches à effectuer – Base de données</a:t>
+            </a:r>
+          </a:p>
+        </p:txBody>
+      </p:sp>
+      <p:pic>
+        <p:nvPicPr>
+          <p:cNvPr id="5" name="Image 4">
+            <a:extLst>
+              <a:ext uri="{FF2B5EF4-FFF2-40B4-BE49-F238E27FC236}">
+                <a16:creationId xmlns:a16="http://schemas.microsoft.com/office/drawing/2014/main" id="{CA99153A-D4F0-40C2-9BB9-05E242F595EB}"/>
+              </a:ext>
+            </a:extLst>
+          </p:cNvPr>
+          <p:cNvPicPr>
+            <a:picLocks noChangeAspect="1"/>
+          </p:cNvPicPr>
+          <p:nvPr/>
+        </p:nvPicPr>
+        <p:blipFill>
+          <a:blip r:embed="rId2">
+            <a:extLst>
+              <a:ext uri="{28A0092B-C50C-407E-A947-70E740481C1C}">
+                <a14:useLocalDpi xmlns:a14="http://schemas.microsoft.com/office/drawing/2010/main" val="0"/>
+              </a:ext>
+            </a:extLst>
+          </a:blip>
+          <a:stretch>
+            <a:fillRect/>
+          </a:stretch>
+        </p:blipFill>
+        <p:spPr>
+          <a:xfrm>
+            <a:off x="2324100" y="1578215"/>
+            <a:ext cx="7543800" cy="5057775"/>
+          </a:xfrm>
+          <a:prstGeom prst="rect">
+            <a:avLst/>
+          </a:prstGeom>
+        </p:spPr>
+      </p:pic>
     </p:spTree>
     <p:extLst>
       <p:ext uri="{BB962C8B-B14F-4D97-AF65-F5344CB8AC3E}">
@@ -4418,14 +4300,20 @@
               <a:t>Court historique </a:t>
             </a:r>
           </a:p>
+          <a:p>
+            <a:r>
+              <a:rPr lang="fr-FR" dirty="0"/>
+              <a:t>Statistiques</a:t>
+            </a:r>
+          </a:p>
         </p:txBody>
       </p:sp>
       <p:pic>
         <p:nvPicPr>
-          <p:cNvPr id="5" name="Image 4" descr="Une image contenant capture d’écran&#10;&#10;Description générée avec un niveau de confiance très élevé">
-            <a:extLst>
-              <a:ext uri="{FF2B5EF4-FFF2-40B4-BE49-F238E27FC236}">
-                <a16:creationId xmlns:a16="http://schemas.microsoft.com/office/drawing/2014/main" id="{DF023B92-C044-44E8-9152-56CB3F2FF0F8}"/>
+          <p:cNvPr id="6" name="Image 5">
+            <a:extLst>
+              <a:ext uri="{FF2B5EF4-FFF2-40B4-BE49-F238E27FC236}">
+                <a16:creationId xmlns:a16="http://schemas.microsoft.com/office/drawing/2014/main" id="{8867E051-D114-4948-A4BA-B7911A86A6DA}"/>
               </a:ext>
             </a:extLst>
           </p:cNvPr>
@@ -4448,8 +4336,8 @@
         </p:blipFill>
         <p:spPr>
           <a:xfrm>
-            <a:off x="5644444" y="681037"/>
-            <a:ext cx="5709356" cy="5718248"/>
+            <a:off x="5737268" y="0"/>
+            <a:ext cx="5130800" cy="6858000"/>
           </a:xfrm>
           <a:prstGeom prst="rect">
             <a:avLst/>
@@ -4608,6 +4496,55 @@
           </a:prstGeom>
         </p:spPr>
       </p:pic>
+      <p:sp>
+        <p:nvSpPr>
+          <p:cNvPr id="4" name="Rectangle : coins arrondis 3">
+            <a:extLst>
+              <a:ext uri="{FF2B5EF4-FFF2-40B4-BE49-F238E27FC236}">
+                <a16:creationId xmlns:a16="http://schemas.microsoft.com/office/drawing/2014/main" id="{A2783919-8285-4317-A0FB-6061315519C3}"/>
+              </a:ext>
+            </a:extLst>
+          </p:cNvPr>
+          <p:cNvSpPr/>
+          <p:nvPr/>
+        </p:nvSpPr>
+        <p:spPr>
+          <a:xfrm>
+            <a:off x="10102788" y="1698396"/>
+            <a:ext cx="1029810" cy="316835"/>
+          </a:xfrm>
+          <a:prstGeom prst="roundRect">
+            <a:avLst/>
+          </a:prstGeom>
+        </p:spPr>
+        <p:style>
+          <a:lnRef idx="2">
+            <a:schemeClr val="accent1">
+              <a:shade val="50000"/>
+            </a:schemeClr>
+          </a:lnRef>
+          <a:fillRef idx="1">
+            <a:schemeClr val="accent1"/>
+          </a:fillRef>
+          <a:effectRef idx="0">
+            <a:schemeClr val="accent1"/>
+          </a:effectRef>
+          <a:fontRef idx="minor">
+            <a:schemeClr val="lt1"/>
+          </a:fontRef>
+        </p:style>
+        <p:txBody>
+          <a:bodyPr rtlCol="0" anchor="ctr"/>
+          <a:lstStyle/>
+          <a:p>
+            <a:pPr algn="ctr"/>
+            <a:r>
+              <a:rPr lang="fr-FR" dirty="0"/>
+              <a:t>Scan</a:t>
+            </a:r>
+          </a:p>
+        </p:txBody>
+      </p:sp>
     </p:spTree>
     <p:extLst>
       <p:ext uri="{BB962C8B-B14F-4D97-AF65-F5344CB8AC3E}">
@@ -5045,7 +4982,7 @@
           <p:cNvPr id="2" name="Titre 1">
             <a:extLst>
               <a:ext uri="{FF2B5EF4-FFF2-40B4-BE49-F238E27FC236}">
-                <a16:creationId xmlns:a16="http://schemas.microsoft.com/office/drawing/2014/main" id="{629AF7F1-2397-4F68-894C-F036B5D837F5}"/>
+                <a16:creationId xmlns:a16="http://schemas.microsoft.com/office/drawing/2014/main" id="{8957233C-3719-45B3-A20B-D3060EB1F688}"/>
               </a:ext>
             </a:extLst>
           </p:cNvPr>
@@ -5073,7 +5010,7 @@
           <p:cNvPr id="3" name="Espace réservé du contenu 2">
             <a:extLst>
               <a:ext uri="{FF2B5EF4-FFF2-40B4-BE49-F238E27FC236}">
-                <a16:creationId xmlns:a16="http://schemas.microsoft.com/office/drawing/2014/main" id="{E77214A2-D9BE-4CB3-A32E-F816EBCA0ABE}"/>
+                <a16:creationId xmlns:a16="http://schemas.microsoft.com/office/drawing/2014/main" id="{3FA24D38-528D-44F9-95B6-9D15BD6E7304}"/>
               </a:ext>
             </a:extLst>
           </p:cNvPr>
@@ -5084,31 +5021,66 @@
             <p:ph idx="1"/>
           </p:nvPr>
         </p:nvSpPr>
-        <p:spPr/>
+        <p:spPr>
+          <a:xfrm>
+            <a:off x="737532" y="1850792"/>
+            <a:ext cx="10515600" cy="4351338"/>
+          </a:xfrm>
+        </p:spPr>
         <p:txBody>
           <a:bodyPr/>
           <a:lstStyle/>
           <a:p>
             <a:r>
               <a:rPr lang="fr-FR" dirty="0"/>
-              <a:t>Interface utilisateur</a:t>
-            </a:r>
-          </a:p>
-          <a:p>
-            <a:r>
-              <a:rPr lang="fr-FR" dirty="0"/>
-              <a:t>Statistiques</a:t>
-            </a:r>
-          </a:p>
-          <a:p>
-            <a:endParaRPr lang="fr-FR" dirty="0"/>
-          </a:p>
-        </p:txBody>
-      </p:sp>
+              <a:t>Diagramme de cas d’utilisation</a:t>
+            </a:r>
+          </a:p>
+        </p:txBody>
+      </p:sp>
+      <p:pic>
+        <p:nvPicPr>
+          <p:cNvPr id="5" name="Image 4">
+            <a:extLst>
+              <a:ext uri="{FF2B5EF4-FFF2-40B4-BE49-F238E27FC236}">
+                <a16:creationId xmlns:a16="http://schemas.microsoft.com/office/drawing/2014/main" id="{94E34C19-69F9-4A53-BF71-C8B77C19C305}"/>
+              </a:ext>
+            </a:extLst>
+          </p:cNvPr>
+          <p:cNvPicPr/>
+          <p:nvPr/>
+        </p:nvPicPr>
+        <p:blipFill>
+          <a:blip r:embed="rId2">
+            <a:extLst>
+              <a:ext uri="{28A0092B-C50C-407E-A947-70E740481C1C}">
+                <a14:useLocalDpi xmlns:a14="http://schemas.microsoft.com/office/drawing/2010/main" val="0"/>
+              </a:ext>
+            </a:extLst>
+          </a:blip>
+          <a:srcRect/>
+          <a:stretch>
+            <a:fillRect/>
+          </a:stretch>
+        </p:blipFill>
+        <p:spPr bwMode="auto">
+          <a:xfrm>
+            <a:off x="3447031" y="2484452"/>
+            <a:ext cx="4375150" cy="3600450"/>
+          </a:xfrm>
+          <a:prstGeom prst="rect">
+            <a:avLst/>
+          </a:prstGeom>
+          <a:noFill/>
+          <a:ln>
+            <a:noFill/>
+          </a:ln>
+        </p:spPr>
+      </p:pic>
     </p:spTree>
     <p:extLst>
       <p:ext uri="{BB962C8B-B14F-4D97-AF65-F5344CB8AC3E}">
-        <p14:creationId xmlns:p14="http://schemas.microsoft.com/office/powerpoint/2010/main" val="112389163"/>
+        <p14:creationId xmlns:p14="http://schemas.microsoft.com/office/powerpoint/2010/main" val="1216803554"/>
       </p:ext>
     </p:extLst>
   </p:cSld>

</xml_diff>